<commit_message>
[add] add result for cancer
</commit_message>
<xml_diff>
--- a/plot_ppt/癌症数据结果的实验图.pptx
+++ b/plot_ppt/癌症数据结果的实验图.pptx
@@ -105,6 +105,11 @@
       </a:defRPr>
     </a:lvl9pPr>
   </p:defaultTextStyle>
+  <p:extLst>
+    <p:ext uri="{EFAFB233-063F-42B5-8137-9DF3F51BA10A}">
+      <p15:sldGuideLst xmlns:p15="http://schemas.microsoft.com/office/powerpoint/2012/main"/>
+    </p:ext>
+  </p:extLst>
 </p:presentation>
 </file>
 
@@ -239,7 +244,7 @@
           <a:p>
             <a:fld id="{2E7F3A59-78AD-A94B-8EA9-EDF434863EE2}" type="datetimeFigureOut">
               <a:rPr kumimoji="1" lang="zh-CN" altLang="en-US" smtClean="0"/>
-              <a:t>2024/4/25</a:t>
+              <a:t>2024/4/30</a:t>
             </a:fld>
             <a:endParaRPr kumimoji="1" lang="zh-CN" altLang="en-US"/>
           </a:p>
@@ -409,7 +414,7 @@
           <a:p>
             <a:fld id="{2E7F3A59-78AD-A94B-8EA9-EDF434863EE2}" type="datetimeFigureOut">
               <a:rPr kumimoji="1" lang="zh-CN" altLang="en-US" smtClean="0"/>
-              <a:t>2024/4/25</a:t>
+              <a:t>2024/4/30</a:t>
             </a:fld>
             <a:endParaRPr kumimoji="1" lang="zh-CN" altLang="en-US"/>
           </a:p>
@@ -589,7 +594,7 @@
           <a:p>
             <a:fld id="{2E7F3A59-78AD-A94B-8EA9-EDF434863EE2}" type="datetimeFigureOut">
               <a:rPr kumimoji="1" lang="zh-CN" altLang="en-US" smtClean="0"/>
-              <a:t>2024/4/25</a:t>
+              <a:t>2024/4/30</a:t>
             </a:fld>
             <a:endParaRPr kumimoji="1" lang="zh-CN" altLang="en-US"/>
           </a:p>
@@ -759,7 +764,7 @@
           <a:p>
             <a:fld id="{2E7F3A59-78AD-A94B-8EA9-EDF434863EE2}" type="datetimeFigureOut">
               <a:rPr kumimoji="1" lang="zh-CN" altLang="en-US" smtClean="0"/>
-              <a:t>2024/4/25</a:t>
+              <a:t>2024/4/30</a:t>
             </a:fld>
             <a:endParaRPr kumimoji="1" lang="zh-CN" altLang="en-US"/>
           </a:p>
@@ -1003,7 +1008,7 @@
           <a:p>
             <a:fld id="{2E7F3A59-78AD-A94B-8EA9-EDF434863EE2}" type="datetimeFigureOut">
               <a:rPr kumimoji="1" lang="zh-CN" altLang="en-US" smtClean="0"/>
-              <a:t>2024/4/25</a:t>
+              <a:t>2024/4/30</a:t>
             </a:fld>
             <a:endParaRPr kumimoji="1" lang="zh-CN" altLang="en-US"/>
           </a:p>
@@ -1235,7 +1240,7 @@
           <a:p>
             <a:fld id="{2E7F3A59-78AD-A94B-8EA9-EDF434863EE2}" type="datetimeFigureOut">
               <a:rPr kumimoji="1" lang="zh-CN" altLang="en-US" smtClean="0"/>
-              <a:t>2024/4/25</a:t>
+              <a:t>2024/4/30</a:t>
             </a:fld>
             <a:endParaRPr kumimoji="1" lang="zh-CN" altLang="en-US"/>
           </a:p>
@@ -1602,7 +1607,7 @@
           <a:p>
             <a:fld id="{2E7F3A59-78AD-A94B-8EA9-EDF434863EE2}" type="datetimeFigureOut">
               <a:rPr kumimoji="1" lang="zh-CN" altLang="en-US" smtClean="0"/>
-              <a:t>2024/4/25</a:t>
+              <a:t>2024/4/30</a:t>
             </a:fld>
             <a:endParaRPr kumimoji="1" lang="zh-CN" altLang="en-US"/>
           </a:p>
@@ -1720,7 +1725,7 @@
           <a:p>
             <a:fld id="{2E7F3A59-78AD-A94B-8EA9-EDF434863EE2}" type="datetimeFigureOut">
               <a:rPr kumimoji="1" lang="zh-CN" altLang="en-US" smtClean="0"/>
-              <a:t>2024/4/25</a:t>
+              <a:t>2024/4/30</a:t>
             </a:fld>
             <a:endParaRPr kumimoji="1" lang="zh-CN" altLang="en-US"/>
           </a:p>
@@ -1815,7 +1820,7 @@
           <a:p>
             <a:fld id="{2E7F3A59-78AD-A94B-8EA9-EDF434863EE2}" type="datetimeFigureOut">
               <a:rPr kumimoji="1" lang="zh-CN" altLang="en-US" smtClean="0"/>
-              <a:t>2024/4/25</a:t>
+              <a:t>2024/4/30</a:t>
             </a:fld>
             <a:endParaRPr kumimoji="1" lang="zh-CN" altLang="en-US"/>
           </a:p>
@@ -2092,7 +2097,7 @@
           <a:p>
             <a:fld id="{2E7F3A59-78AD-A94B-8EA9-EDF434863EE2}" type="datetimeFigureOut">
               <a:rPr kumimoji="1" lang="zh-CN" altLang="en-US" smtClean="0"/>
-              <a:t>2024/4/25</a:t>
+              <a:t>2024/4/30</a:t>
             </a:fld>
             <a:endParaRPr kumimoji="1" lang="zh-CN" altLang="en-US"/>
           </a:p>
@@ -2349,7 +2354,7 @@
           <a:p>
             <a:fld id="{2E7F3A59-78AD-A94B-8EA9-EDF434863EE2}" type="datetimeFigureOut">
               <a:rPr kumimoji="1" lang="zh-CN" altLang="en-US" smtClean="0"/>
-              <a:t>2024/4/25</a:t>
+              <a:t>2024/4/30</a:t>
             </a:fld>
             <a:endParaRPr kumimoji="1" lang="zh-CN" altLang="en-US"/>
           </a:p>
@@ -2562,7 +2567,7 @@
           <a:p>
             <a:fld id="{2E7F3A59-78AD-A94B-8EA9-EDF434863EE2}" type="datetimeFigureOut">
               <a:rPr kumimoji="1" lang="zh-CN" altLang="en-US" smtClean="0"/>
-              <a:t>2024/4/25</a:t>
+              <a:t>2024/4/30</a:t>
             </a:fld>
             <a:endParaRPr kumimoji="1" lang="zh-CN" altLang="en-US"/>
           </a:p>
@@ -3009,7 +3014,14 @@
           <a:lstStyle/>
           <a:p>
             <a:pPr algn="ctr"/>
-            <a:endParaRPr kumimoji="1" lang="zh-CN" altLang="en-US"/>
+            <a:r>
+              <a:rPr kumimoji="1" lang="en-US" altLang="zh-CN" dirty="0"/>
+              <a:t>ACC</a:t>
+            </a:r>
+            <a:r>
+              <a:rPr kumimoji="1" lang="zh-CN" altLang="en-US" dirty="0"/>
+              <a:t>图</a:t>
+            </a:r>
           </a:p>
         </p:txBody>
       </p:sp>
@@ -3055,7 +3067,11 @@
           <a:lstStyle/>
           <a:p>
             <a:pPr algn="ctr"/>
-            <a:endParaRPr kumimoji="1" lang="zh-CN" altLang="en-US"/>
+            <a:r>
+              <a:rPr kumimoji="1" lang="en-US" altLang="zh-CN" dirty="0"/>
+              <a:t>heatmap</a:t>
+            </a:r>
+            <a:endParaRPr kumimoji="1" lang="zh-CN" altLang="en-US" dirty="0"/>
           </a:p>
         </p:txBody>
       </p:sp>
@@ -3101,7 +3117,10 @@
           <a:lstStyle/>
           <a:p>
             <a:pPr algn="ctr"/>
-            <a:endParaRPr kumimoji="1" lang="zh-CN" altLang="en-US"/>
+            <a:r>
+              <a:rPr kumimoji="1" lang="en-US" altLang="zh-CN" dirty="0"/>
+              <a:t>Heatmap</a:t>
+            </a:r>
           </a:p>
         </p:txBody>
       </p:sp>
@@ -3239,7 +3258,17 @@
           <a:lstStyle/>
           <a:p>
             <a:pPr algn="ctr"/>
-            <a:endParaRPr kumimoji="1" lang="zh-CN" altLang="en-US"/>
+            <a:r>
+              <a:rPr kumimoji="1" lang="en-US" altLang="zh-CN" dirty="0"/>
+              <a:t>UMAP</a:t>
+            </a:r>
+            <a:br>
+              <a:rPr kumimoji="1" lang="en-US" altLang="zh-CN" dirty="0"/>
+            </a:br>
+            <a:r>
+              <a:rPr kumimoji="1" lang="zh-CN" altLang="en-US" dirty="0"/>
+              <a:t>类型</a:t>
+            </a:r>
           </a:p>
         </p:txBody>
       </p:sp>
@@ -3285,7 +3314,17 @@
           <a:lstStyle/>
           <a:p>
             <a:pPr algn="ctr"/>
-            <a:endParaRPr kumimoji="1" lang="zh-CN" altLang="en-US"/>
+            <a:r>
+              <a:rPr kumimoji="1" lang="en-US" altLang="zh-CN" dirty="0"/>
+              <a:t>UMAP</a:t>
+            </a:r>
+            <a:br>
+              <a:rPr kumimoji="1" lang="en-US" altLang="zh-CN" dirty="0"/>
+            </a:br>
+            <a:r>
+              <a:rPr kumimoji="1" lang="zh-CN" altLang="en-US" dirty="0"/>
+              <a:t>细胞状态</a:t>
+            </a:r>
           </a:p>
         </p:txBody>
       </p:sp>
@@ -3331,7 +3370,7 @@
           <a:lstStyle/>
           <a:p>
             <a:pPr algn="ctr"/>
-            <a:endParaRPr kumimoji="1" lang="zh-CN" altLang="en-US"/>
+            <a:endParaRPr kumimoji="1" lang="zh-CN" altLang="en-US" dirty="0"/>
           </a:p>
         </p:txBody>
       </p:sp>
@@ -3519,6 +3558,36 @@
           </a:p>
         </p:txBody>
       </p:sp>
+      <p:pic>
+        <p:nvPicPr>
+          <p:cNvPr id="2" name="图片 1">
+            <a:extLst>
+              <a:ext uri="{FF2B5EF4-FFF2-40B4-BE49-F238E27FC236}">
+                <a16:creationId xmlns:a16="http://schemas.microsoft.com/office/drawing/2014/main" id="{81174F93-B3E2-3C32-BE7E-BACFCC9355D7}"/>
+              </a:ext>
+            </a:extLst>
+          </p:cNvPr>
+          <p:cNvPicPr>
+            <a:picLocks noChangeAspect="1"/>
+          </p:cNvPicPr>
+          <p:nvPr/>
+        </p:nvPicPr>
+        <p:blipFill>
+          <a:blip r:embed="rId2"/>
+          <a:stretch>
+            <a:fillRect/>
+          </a:stretch>
+        </p:blipFill>
+        <p:spPr>
+          <a:xfrm>
+            <a:off x="4779479" y="6682976"/>
+            <a:ext cx="1991306" cy="1559241"/>
+          </a:xfrm>
+          <a:prstGeom prst="rect">
+            <a:avLst/>
+          </a:prstGeom>
+        </p:spPr>
+      </p:pic>
     </p:spTree>
     <p:extLst>
       <p:ext uri="{BB962C8B-B14F-4D97-AF65-F5344CB8AC3E}">

</xml_diff>